<commit_message>
commit upto chapter 4 - All basics
</commit_message>
<xml_diff>
--- a/Presentations/Chapter 1/Chapter 1.pptx
+++ b/Presentations/Chapter 1/Chapter 1.pptx
@@ -6,6 +6,10 @@
   </p:sldMasterIdLst>
   <p:sldIdLst>
     <p:sldId id="256" r:id="rId2"/>
+    <p:sldId id="257" r:id="rId3"/>
+    <p:sldId id="258" r:id="rId4"/>
+    <p:sldId id="259" r:id="rId5"/>
+    <p:sldId id="260" r:id="rId6"/>
   </p:sldIdLst>
   <p:sldSz cx="12192000" cy="6858000"/>
   <p:notesSz cx="6858000" cy="9144000"/>
@@ -104,6 +108,11 @@
       </a:defRPr>
     </a:lvl9pPr>
   </p:defaultTextStyle>
+  <p:extLst>
+    <p:ext uri="{EFAFB233-063F-42B5-8137-9DF3F51BA10A}">
+      <p15:sldGuideLst xmlns:p15="http://schemas.microsoft.com/office/powerpoint/2012/main"/>
+    </p:ext>
+  </p:extLst>
 </p:presentation>
 </file>
 
@@ -3819,6 +3828,10 @@
           <a:bodyPr/>
           <a:lstStyle/>
           <a:p>
+            <a:r>
+              <a:rPr lang="en-US" dirty="0" smtClean="0"/>
+              <a:t>Starting with GITHUB</a:t>
+            </a:r>
             <a:endParaRPr lang="en-US" dirty="0"/>
           </a:p>
         </p:txBody>
@@ -3838,7 +3851,19 @@
           <a:bodyPr/>
           <a:lstStyle/>
           <a:p>
-            <a:endParaRPr lang="en-US"/>
+            <a:r>
+              <a:rPr lang="en-US" dirty="0" smtClean="0"/>
+              <a:t>Installing </a:t>
+            </a:r>
+            <a:r>
+              <a:rPr lang="en-US" dirty="0" err="1" smtClean="0"/>
+              <a:t>git</a:t>
+            </a:r>
+            <a:r>
+              <a:rPr lang="en-US" dirty="0" smtClean="0"/>
+              <a:t>-hub user interface</a:t>
+            </a:r>
+            <a:endParaRPr lang="en-US" dirty="0"/>
           </a:p>
         </p:txBody>
       </p:sp>
@@ -3846,6 +3871,779 @@
     <p:extLst>
       <p:ext uri="{BB962C8B-B14F-4D97-AF65-F5344CB8AC3E}">
         <p14:creationId xmlns:p14="http://schemas.microsoft.com/office/powerpoint/2010/main" val="2375935274"/>
+      </p:ext>
+    </p:extLst>
+  </p:cSld>
+  <p:clrMapOvr>
+    <a:masterClrMapping/>
+  </p:clrMapOvr>
+  <p:timing>
+    <p:tnLst>
+      <p:par>
+        <p:cTn id="1" dur="indefinite" restart="never" nodeType="tmRoot"/>
+      </p:par>
+    </p:tnLst>
+  </p:timing>
+</p:sld>
+</file>
+
+<file path=ppt/slides/slide2.xml><?xml version="1.0" encoding="utf-8"?>
+<p:sld xmlns:a="http://schemas.openxmlformats.org/drawingml/2006/main" xmlns:r="http://schemas.openxmlformats.org/officeDocument/2006/relationships" xmlns:p="http://schemas.openxmlformats.org/presentationml/2006/main">
+  <p:cSld>
+    <p:spTree>
+      <p:nvGrpSpPr>
+        <p:cNvPr id="1" name=""/>
+        <p:cNvGrpSpPr/>
+        <p:nvPr/>
+      </p:nvGrpSpPr>
+      <p:grpSpPr>
+        <a:xfrm>
+          <a:off x="0" y="0"/>
+          <a:ext cx="0" cy="0"/>
+          <a:chOff x="0" y="0"/>
+          <a:chExt cx="0" cy="0"/>
+        </a:xfrm>
+      </p:grpSpPr>
+      <p:pic>
+        <p:nvPicPr>
+          <p:cNvPr id="6" name="Content Placeholder 5"/>
+          <p:cNvPicPr>
+            <a:picLocks noGrp="1" noChangeAspect="1"/>
+          </p:cNvPicPr>
+          <p:nvPr>
+            <p:ph idx="1"/>
+          </p:nvPr>
+        </p:nvPicPr>
+        <p:blipFill>
+          <a:blip r:embed="rId2">
+            <a:extLst>
+              <a:ext uri="{28A0092B-C50C-407E-A947-70E740481C1C}">
+                <a14:useLocalDpi xmlns:a14="http://schemas.microsoft.com/office/drawing/2010/main" val="0"/>
+              </a:ext>
+            </a:extLst>
+          </a:blip>
+          <a:stretch>
+            <a:fillRect/>
+          </a:stretch>
+        </p:blipFill>
+        <p:spPr>
+          <a:xfrm>
+            <a:off x="4473054" y="131544"/>
+            <a:ext cx="7468737" cy="2254878"/>
+          </a:xfrm>
+        </p:spPr>
+      </p:pic>
+      <p:sp>
+        <p:nvSpPr>
+          <p:cNvPr id="5" name="TextBox 4"/>
+          <p:cNvSpPr txBox="1"/>
+          <p:nvPr/>
+        </p:nvSpPr>
+        <p:spPr>
+          <a:xfrm>
+            <a:off x="150125" y="354842"/>
+            <a:ext cx="3780430" cy="3785652"/>
+          </a:xfrm>
+          <a:prstGeom prst="rect">
+            <a:avLst/>
+          </a:prstGeom>
+          <a:noFill/>
+        </p:spPr>
+        <p:txBody>
+          <a:bodyPr wrap="square" rtlCol="0">
+            <a:spAutoFit/>
+          </a:bodyPr>
+          <a:lstStyle/>
+          <a:p>
+            <a:pPr marL="342900" indent="-342900">
+              <a:buAutoNum type="arabicParenR"/>
+            </a:pPr>
+            <a:r>
+              <a:rPr lang="en-US" sz="2400" dirty="0" smtClean="0">
+                <a:solidFill>
+                  <a:schemeClr val="bg1"/>
+                </a:solidFill>
+              </a:rPr>
+              <a:t>Download user interface </a:t>
+            </a:r>
+            <a:br>
+              <a:rPr lang="en-US" sz="2400" dirty="0" smtClean="0">
+                <a:solidFill>
+                  <a:schemeClr val="bg1"/>
+                </a:solidFill>
+              </a:rPr>
+            </a:br>
+            <a:r>
+              <a:rPr lang="en-US" sz="2400" dirty="0" smtClean="0">
+                <a:solidFill>
+                  <a:schemeClr val="bg1"/>
+                </a:solidFill>
+              </a:rPr>
+              <a:t>Windows : windows.github.com</a:t>
+            </a:r>
+            <a:br>
+              <a:rPr lang="en-US" sz="2400" dirty="0" smtClean="0">
+                <a:solidFill>
+                  <a:schemeClr val="bg1"/>
+                </a:solidFill>
+              </a:rPr>
+            </a:br>
+            <a:r>
+              <a:rPr lang="en-US" sz="2400" dirty="0" smtClean="0">
+                <a:solidFill>
+                  <a:schemeClr val="bg1"/>
+                </a:solidFill>
+              </a:rPr>
+              <a:t>Mac : Mac.github.com</a:t>
+            </a:r>
+          </a:p>
+          <a:p>
+            <a:pPr marL="342900" indent="-342900">
+              <a:buAutoNum type="arabicParenR"/>
+            </a:pPr>
+            <a:endParaRPr lang="en-US" sz="2400" dirty="0" smtClean="0">
+              <a:solidFill>
+                <a:schemeClr val="bg1"/>
+              </a:solidFill>
+            </a:endParaRPr>
+          </a:p>
+          <a:p>
+            <a:pPr marL="342900" indent="-342900">
+              <a:buAutoNum type="arabicParenR"/>
+            </a:pPr>
+            <a:r>
+              <a:rPr lang="en-US" sz="2400" dirty="0" smtClean="0">
+                <a:solidFill>
+                  <a:schemeClr val="bg1"/>
+                </a:solidFill>
+              </a:rPr>
+              <a:t>Install it, After installation you’ll find two icons.</a:t>
+            </a:r>
+            <a:br>
+              <a:rPr lang="en-US" sz="2400" dirty="0" smtClean="0">
+                <a:solidFill>
+                  <a:schemeClr val="bg1"/>
+                </a:solidFill>
+              </a:rPr>
+            </a:br>
+            <a:r>
+              <a:rPr lang="en-US" sz="2400" dirty="0" smtClean="0">
+                <a:solidFill>
+                  <a:schemeClr val="bg1"/>
+                </a:solidFill>
+              </a:rPr>
+              <a:t>The </a:t>
+            </a:r>
+            <a:r>
+              <a:rPr lang="en-US" sz="2400" dirty="0" err="1" smtClean="0">
+                <a:solidFill>
+                  <a:schemeClr val="bg1"/>
+                </a:solidFill>
+              </a:rPr>
+              <a:t>Gitshell</a:t>
+            </a:r>
+            <a:r>
+              <a:rPr lang="en-US" sz="2400" dirty="0" smtClean="0">
+                <a:solidFill>
+                  <a:schemeClr val="bg1"/>
+                </a:solidFill>
+              </a:rPr>
+              <a:t> is command line and </a:t>
+            </a:r>
+            <a:r>
+              <a:rPr lang="en-US" sz="2400" dirty="0" err="1" smtClean="0">
+                <a:solidFill>
+                  <a:schemeClr val="bg1"/>
+                </a:solidFill>
+              </a:rPr>
+              <a:t>Github</a:t>
+            </a:r>
+            <a:r>
+              <a:rPr lang="en-US" sz="2400" dirty="0" smtClean="0">
+                <a:solidFill>
+                  <a:schemeClr val="bg1"/>
+                </a:solidFill>
+              </a:rPr>
+              <a:t> is the user interface</a:t>
+            </a:r>
+            <a:r>
+              <a:rPr lang="en-US" dirty="0" smtClean="0"/>
+              <a:t>.</a:t>
+            </a:r>
+          </a:p>
+        </p:txBody>
+      </p:sp>
+      <p:pic>
+        <p:nvPicPr>
+          <p:cNvPr id="7" name="Picture 6"/>
+          <p:cNvPicPr>
+            <a:picLocks noChangeAspect="1"/>
+          </p:cNvPicPr>
+          <p:nvPr/>
+        </p:nvPicPr>
+        <p:blipFill>
+          <a:blip r:embed="rId3">
+            <a:extLst>
+              <a:ext uri="{28A0092B-C50C-407E-A947-70E740481C1C}">
+                <a14:useLocalDpi xmlns:a14="http://schemas.microsoft.com/office/drawing/2010/main" val="0"/>
+              </a:ext>
+            </a:extLst>
+          </a:blip>
+          <a:stretch>
+            <a:fillRect/>
+          </a:stretch>
+        </p:blipFill>
+        <p:spPr>
+          <a:xfrm>
+            <a:off x="6250674" y="2898163"/>
+            <a:ext cx="3193577" cy="3093203"/>
+          </a:xfrm>
+          <a:prstGeom prst="rect">
+            <a:avLst/>
+          </a:prstGeom>
+        </p:spPr>
+      </p:pic>
+      <p:sp>
+        <p:nvSpPr>
+          <p:cNvPr id="8" name="TextBox 7"/>
+          <p:cNvSpPr txBox="1"/>
+          <p:nvPr/>
+        </p:nvSpPr>
+        <p:spPr>
+          <a:xfrm>
+            <a:off x="4094328" y="1001172"/>
+            <a:ext cx="378726" cy="369332"/>
+          </a:xfrm>
+          <a:prstGeom prst="rect">
+            <a:avLst/>
+          </a:prstGeom>
+          <a:noFill/>
+        </p:spPr>
+        <p:txBody>
+          <a:bodyPr wrap="square" rtlCol="0">
+            <a:spAutoFit/>
+          </a:bodyPr>
+          <a:lstStyle/>
+          <a:p>
+            <a:r>
+              <a:rPr lang="en-US" dirty="0" smtClean="0"/>
+              <a:t>1.</a:t>
+            </a:r>
+            <a:endParaRPr lang="en-US" dirty="0"/>
+          </a:p>
+        </p:txBody>
+      </p:sp>
+      <p:sp>
+        <p:nvSpPr>
+          <p:cNvPr id="9" name="TextBox 8"/>
+          <p:cNvSpPr txBox="1"/>
+          <p:nvPr/>
+        </p:nvSpPr>
+        <p:spPr>
+          <a:xfrm>
+            <a:off x="4348518" y="4260098"/>
+            <a:ext cx="656799" cy="369332"/>
+          </a:xfrm>
+          <a:prstGeom prst="rect">
+            <a:avLst/>
+          </a:prstGeom>
+          <a:noFill/>
+        </p:spPr>
+        <p:txBody>
+          <a:bodyPr wrap="square" rtlCol="0">
+            <a:spAutoFit/>
+          </a:bodyPr>
+          <a:lstStyle/>
+          <a:p>
+            <a:r>
+              <a:rPr lang="en-US" dirty="0" smtClean="0"/>
+              <a:t>2.</a:t>
+            </a:r>
+            <a:endParaRPr lang="en-US" dirty="0"/>
+          </a:p>
+        </p:txBody>
+      </p:sp>
+    </p:spTree>
+    <p:extLst>
+      <p:ext uri="{BB962C8B-B14F-4D97-AF65-F5344CB8AC3E}">
+        <p14:creationId xmlns:p14="http://schemas.microsoft.com/office/powerpoint/2010/main" val="3210520000"/>
+      </p:ext>
+    </p:extLst>
+  </p:cSld>
+  <p:clrMapOvr>
+    <a:masterClrMapping/>
+  </p:clrMapOvr>
+  <p:timing>
+    <p:tnLst>
+      <p:par>
+        <p:cTn id="1" dur="indefinite" restart="never" nodeType="tmRoot"/>
+      </p:par>
+    </p:tnLst>
+  </p:timing>
+</p:sld>
+</file>
+
+<file path=ppt/slides/slide3.xml><?xml version="1.0" encoding="utf-8"?>
+<p:sld xmlns:a="http://schemas.openxmlformats.org/drawingml/2006/main" xmlns:r="http://schemas.openxmlformats.org/officeDocument/2006/relationships" xmlns:p="http://schemas.openxmlformats.org/presentationml/2006/main">
+  <p:cSld>
+    <p:spTree>
+      <p:nvGrpSpPr>
+        <p:cNvPr id="1" name=""/>
+        <p:cNvGrpSpPr/>
+        <p:nvPr/>
+      </p:nvGrpSpPr>
+      <p:grpSpPr>
+        <a:xfrm>
+          <a:off x="0" y="0"/>
+          <a:ext cx="0" cy="0"/>
+          <a:chOff x="0" y="0"/>
+          <a:chExt cx="0" cy="0"/>
+        </a:xfrm>
+      </p:grpSpPr>
+      <p:pic>
+        <p:nvPicPr>
+          <p:cNvPr id="7" name="Content Placeholder 6"/>
+          <p:cNvPicPr>
+            <a:picLocks noGrp="1" noChangeAspect="1"/>
+          </p:cNvPicPr>
+          <p:nvPr>
+            <p:ph idx="1"/>
+          </p:nvPr>
+        </p:nvPicPr>
+        <p:blipFill>
+          <a:blip r:embed="rId2">
+            <a:extLst>
+              <a:ext uri="{28A0092B-C50C-407E-A947-70E740481C1C}">
+                <a14:useLocalDpi xmlns:a14="http://schemas.microsoft.com/office/drawing/2010/main" val="0"/>
+              </a:ext>
+            </a:extLst>
+          </a:blip>
+          <a:stretch>
+            <a:fillRect/>
+          </a:stretch>
+        </p:blipFill>
+        <p:spPr>
+          <a:xfrm>
+            <a:off x="4883195" y="2060812"/>
+            <a:ext cx="5354898" cy="2200164"/>
+          </a:xfrm>
+        </p:spPr>
+      </p:pic>
+      <p:sp>
+        <p:nvSpPr>
+          <p:cNvPr id="6" name="TextBox 5"/>
+          <p:cNvSpPr txBox="1"/>
+          <p:nvPr/>
+        </p:nvSpPr>
+        <p:spPr>
+          <a:xfrm>
+            <a:off x="232012" y="341194"/>
+            <a:ext cx="3330054" cy="4062651"/>
+          </a:xfrm>
+          <a:prstGeom prst="rect">
+            <a:avLst/>
+          </a:prstGeom>
+          <a:noFill/>
+        </p:spPr>
+        <p:txBody>
+          <a:bodyPr wrap="square" rtlCol="0">
+            <a:spAutoFit/>
+          </a:bodyPr>
+          <a:lstStyle/>
+          <a:p>
+            <a:pPr marL="342900" indent="-342900">
+              <a:buAutoNum type="arabicParenR"/>
+            </a:pPr>
+            <a:r>
+              <a:rPr lang="en-US" sz="2400" dirty="0" smtClean="0">
+                <a:solidFill>
+                  <a:schemeClr val="bg1"/>
+                </a:solidFill>
+              </a:rPr>
+              <a:t>Open </a:t>
+            </a:r>
+            <a:r>
+              <a:rPr lang="en-US" sz="2400" dirty="0" err="1" smtClean="0">
+                <a:solidFill>
+                  <a:schemeClr val="bg1"/>
+                </a:solidFill>
+              </a:rPr>
+              <a:t>Github</a:t>
+            </a:r>
+            <a:r>
+              <a:rPr lang="en-US" sz="2400" dirty="0" smtClean="0">
+                <a:solidFill>
+                  <a:schemeClr val="bg1"/>
+                </a:solidFill>
+              </a:rPr>
+              <a:t>.</a:t>
+            </a:r>
+            <a:r>
+              <a:rPr lang="en-US" sz="2400" dirty="0">
+                <a:solidFill>
+                  <a:schemeClr val="bg1"/>
+                </a:solidFill>
+              </a:rPr>
+              <a:t/>
+            </a:r>
+            <a:br>
+              <a:rPr lang="en-US" sz="2400" dirty="0">
+                <a:solidFill>
+                  <a:schemeClr val="bg1"/>
+                </a:solidFill>
+              </a:rPr>
+            </a:br>
+            <a:r>
+              <a:rPr lang="en-US" sz="2400" dirty="0" smtClean="0">
+                <a:solidFill>
+                  <a:schemeClr val="bg1"/>
+                </a:solidFill>
+              </a:rPr>
+              <a:t>Setup your username and email.</a:t>
+            </a:r>
+            <a:br>
+              <a:rPr lang="en-US" sz="2400" dirty="0" smtClean="0">
+                <a:solidFill>
+                  <a:schemeClr val="bg1"/>
+                </a:solidFill>
+              </a:rPr>
+            </a:br>
+            <a:r>
+              <a:rPr lang="en-US" sz="2400" dirty="0" smtClean="0">
+                <a:solidFill>
+                  <a:schemeClr val="bg1"/>
+                </a:solidFill>
+              </a:rPr>
+              <a:t>(You also can set this up via the command line, we’ll see that too later)</a:t>
+            </a:r>
+          </a:p>
+          <a:p>
+            <a:pPr marL="342900" indent="-342900">
+              <a:buAutoNum type="arabicParenR"/>
+            </a:pPr>
+            <a:endParaRPr lang="en-US" sz="2400" dirty="0">
+              <a:solidFill>
+                <a:schemeClr val="bg1"/>
+              </a:solidFill>
+            </a:endParaRPr>
+          </a:p>
+          <a:p>
+            <a:pPr marL="342900" indent="-342900">
+              <a:buAutoNum type="arabicParenR"/>
+            </a:pPr>
+            <a:r>
+              <a:rPr lang="en-US" sz="2400" dirty="0" smtClean="0">
+                <a:solidFill>
+                  <a:schemeClr val="bg1"/>
+                </a:solidFill>
+              </a:rPr>
+              <a:t>Now go to </a:t>
+            </a:r>
+            <a:r>
+              <a:rPr lang="en-US" sz="2400" dirty="0" smtClean="0">
+                <a:solidFill>
+                  <a:schemeClr val="bg1"/>
+                </a:solidFill>
+                <a:hlinkClick r:id="rId3"/>
+              </a:rPr>
+              <a:t>www.github.com</a:t>
+            </a:r>
+            <a:endParaRPr lang="en-US" sz="2400" dirty="0" smtClean="0">
+              <a:solidFill>
+                <a:schemeClr val="bg1"/>
+              </a:solidFill>
+            </a:endParaRPr>
+          </a:p>
+          <a:p>
+            <a:endParaRPr lang="en-US" dirty="0" smtClean="0"/>
+          </a:p>
+        </p:txBody>
+      </p:sp>
+    </p:spTree>
+    <p:extLst>
+      <p:ext uri="{BB962C8B-B14F-4D97-AF65-F5344CB8AC3E}">
+        <p14:creationId xmlns:p14="http://schemas.microsoft.com/office/powerpoint/2010/main" val="3490627459"/>
+      </p:ext>
+    </p:extLst>
+  </p:cSld>
+  <p:clrMapOvr>
+    <a:masterClrMapping/>
+  </p:clrMapOvr>
+  <p:timing>
+    <p:tnLst>
+      <p:par>
+        <p:cTn id="1" dur="indefinite" restart="never" nodeType="tmRoot"/>
+      </p:par>
+    </p:tnLst>
+  </p:timing>
+</p:sld>
+</file>
+
+<file path=ppt/slides/slide4.xml><?xml version="1.0" encoding="utf-8"?>
+<p:sld xmlns:a="http://schemas.openxmlformats.org/drawingml/2006/main" xmlns:r="http://schemas.openxmlformats.org/officeDocument/2006/relationships" xmlns:p="http://schemas.openxmlformats.org/presentationml/2006/main">
+  <p:cSld>
+    <p:spTree>
+      <p:nvGrpSpPr>
+        <p:cNvPr id="1" name=""/>
+        <p:cNvGrpSpPr/>
+        <p:nvPr/>
+      </p:nvGrpSpPr>
+      <p:grpSpPr>
+        <a:xfrm>
+          <a:off x="0" y="0"/>
+          <a:ext cx="0" cy="0"/>
+          <a:chOff x="0" y="0"/>
+          <a:chExt cx="0" cy="0"/>
+        </a:xfrm>
+      </p:grpSpPr>
+      <p:pic>
+        <p:nvPicPr>
+          <p:cNvPr id="6" name="Content Placeholder 5"/>
+          <p:cNvPicPr>
+            <a:picLocks noGrp="1" noChangeAspect="1"/>
+          </p:cNvPicPr>
+          <p:nvPr>
+            <p:ph idx="1"/>
+          </p:nvPr>
+        </p:nvPicPr>
+        <p:blipFill>
+          <a:blip r:embed="rId2">
+            <a:extLst>
+              <a:ext uri="{28A0092B-C50C-407E-A947-70E740481C1C}">
+                <a14:useLocalDpi xmlns:a14="http://schemas.microsoft.com/office/drawing/2010/main" val="0"/>
+              </a:ext>
+            </a:extLst>
+          </a:blip>
+          <a:stretch>
+            <a:fillRect/>
+          </a:stretch>
+        </p:blipFill>
+        <p:spPr>
+          <a:xfrm>
+            <a:off x="4650475" y="204716"/>
+            <a:ext cx="7195782" cy="3589362"/>
+          </a:xfrm>
+        </p:spPr>
+      </p:pic>
+      <p:sp>
+        <p:nvSpPr>
+          <p:cNvPr id="5" name="TextBox 4"/>
+          <p:cNvSpPr txBox="1"/>
+          <p:nvPr/>
+        </p:nvSpPr>
+        <p:spPr>
+          <a:xfrm>
+            <a:off x="0" y="204716"/>
+            <a:ext cx="3916907" cy="2677656"/>
+          </a:xfrm>
+          <a:prstGeom prst="rect">
+            <a:avLst/>
+          </a:prstGeom>
+          <a:noFill/>
+        </p:spPr>
+        <p:txBody>
+          <a:bodyPr wrap="square" rtlCol="0">
+            <a:spAutoFit/>
+          </a:bodyPr>
+          <a:lstStyle/>
+          <a:p>
+            <a:pPr marL="342900" indent="-342900">
+              <a:buAutoNum type="arabicParenR"/>
+            </a:pPr>
+            <a:r>
+              <a:rPr lang="en-US" sz="2400" dirty="0" smtClean="0">
+                <a:solidFill>
+                  <a:schemeClr val="bg1"/>
+                </a:solidFill>
+              </a:rPr>
+              <a:t>Enter you user details to create a new account.(Don’t worry it’s free !)</a:t>
+            </a:r>
+          </a:p>
+          <a:p>
+            <a:pPr marL="342900" indent="-342900">
+              <a:buAutoNum type="arabicParenR"/>
+            </a:pPr>
+            <a:endParaRPr lang="en-US" sz="2400" dirty="0" smtClean="0">
+              <a:solidFill>
+                <a:schemeClr val="bg1"/>
+              </a:solidFill>
+            </a:endParaRPr>
+          </a:p>
+          <a:p>
+            <a:pPr marL="342900" indent="-342900">
+              <a:buAutoNum type="arabicParenR"/>
+            </a:pPr>
+            <a:r>
+              <a:rPr lang="en-US" sz="2400" dirty="0" smtClean="0">
+                <a:solidFill>
+                  <a:schemeClr val="bg1"/>
+                </a:solidFill>
+              </a:rPr>
+              <a:t>Check out the plans (If you want to select any other….)</a:t>
+            </a:r>
+            <a:endParaRPr lang="en-US" sz="2400" dirty="0">
+              <a:solidFill>
+                <a:schemeClr val="bg1"/>
+              </a:solidFill>
+            </a:endParaRPr>
+          </a:p>
+        </p:txBody>
+      </p:sp>
+      <p:pic>
+        <p:nvPicPr>
+          <p:cNvPr id="7" name="Picture 6"/>
+          <p:cNvPicPr>
+            <a:picLocks noChangeAspect="1"/>
+          </p:cNvPicPr>
+          <p:nvPr/>
+        </p:nvPicPr>
+        <p:blipFill>
+          <a:blip r:embed="rId3">
+            <a:extLst>
+              <a:ext uri="{28A0092B-C50C-407E-A947-70E740481C1C}">
+                <a14:useLocalDpi xmlns:a14="http://schemas.microsoft.com/office/drawing/2010/main" val="0"/>
+              </a:ext>
+            </a:extLst>
+          </a:blip>
+          <a:stretch>
+            <a:fillRect/>
+          </a:stretch>
+        </p:blipFill>
+        <p:spPr>
+          <a:xfrm>
+            <a:off x="4650475" y="3475192"/>
+            <a:ext cx="7195782" cy="3210373"/>
+          </a:xfrm>
+          <a:prstGeom prst="rect">
+            <a:avLst/>
+          </a:prstGeom>
+        </p:spPr>
+      </p:pic>
+      <p:sp>
+        <p:nvSpPr>
+          <p:cNvPr id="8" name="TextBox 7"/>
+          <p:cNvSpPr txBox="1"/>
+          <p:nvPr/>
+        </p:nvSpPr>
+        <p:spPr>
+          <a:xfrm>
+            <a:off x="4099447" y="1814731"/>
+            <a:ext cx="368489" cy="369332"/>
+          </a:xfrm>
+          <a:prstGeom prst="rect">
+            <a:avLst/>
+          </a:prstGeom>
+          <a:noFill/>
+        </p:spPr>
+        <p:txBody>
+          <a:bodyPr wrap="square" rtlCol="0">
+            <a:spAutoFit/>
+          </a:bodyPr>
+          <a:lstStyle/>
+          <a:p>
+            <a:r>
+              <a:rPr lang="en-US" dirty="0" smtClean="0"/>
+              <a:t>1.</a:t>
+            </a:r>
+            <a:endParaRPr lang="en-US" dirty="0"/>
+          </a:p>
+        </p:txBody>
+      </p:sp>
+      <p:sp>
+        <p:nvSpPr>
+          <p:cNvPr id="9" name="TextBox 8"/>
+          <p:cNvSpPr txBox="1"/>
+          <p:nvPr/>
+        </p:nvSpPr>
+        <p:spPr>
+          <a:xfrm>
+            <a:off x="4283691" y="4895712"/>
+            <a:ext cx="368489" cy="369332"/>
+          </a:xfrm>
+          <a:prstGeom prst="rect">
+            <a:avLst/>
+          </a:prstGeom>
+          <a:noFill/>
+        </p:spPr>
+        <p:txBody>
+          <a:bodyPr wrap="square" rtlCol="0">
+            <a:spAutoFit/>
+          </a:bodyPr>
+          <a:lstStyle/>
+          <a:p>
+            <a:r>
+              <a:rPr lang="en-US" dirty="0" smtClean="0"/>
+              <a:t>2.</a:t>
+            </a:r>
+            <a:endParaRPr lang="en-US" dirty="0"/>
+          </a:p>
+        </p:txBody>
+      </p:sp>
+    </p:spTree>
+    <p:extLst>
+      <p:ext uri="{BB962C8B-B14F-4D97-AF65-F5344CB8AC3E}">
+        <p14:creationId xmlns:p14="http://schemas.microsoft.com/office/powerpoint/2010/main" val="334411177"/>
+      </p:ext>
+    </p:extLst>
+  </p:cSld>
+  <p:clrMapOvr>
+    <a:masterClrMapping/>
+  </p:clrMapOvr>
+  <p:timing>
+    <p:tnLst>
+      <p:par>
+        <p:cTn id="1" dur="indefinite" restart="never" nodeType="tmRoot"/>
+      </p:par>
+    </p:tnLst>
+  </p:timing>
+</p:sld>
+</file>
+
+<file path=ppt/slides/slide5.xml><?xml version="1.0" encoding="utf-8"?>
+<p:sld xmlns:a="http://schemas.openxmlformats.org/drawingml/2006/main" xmlns:r="http://schemas.openxmlformats.org/officeDocument/2006/relationships" xmlns:p="http://schemas.openxmlformats.org/presentationml/2006/main">
+  <p:cSld>
+    <p:spTree>
+      <p:nvGrpSpPr>
+        <p:cNvPr id="1" name=""/>
+        <p:cNvGrpSpPr/>
+        <p:nvPr/>
+      </p:nvGrpSpPr>
+      <p:grpSpPr>
+        <a:xfrm>
+          <a:off x="0" y="0"/>
+          <a:ext cx="0" cy="0"/>
+          <a:chOff x="0" y="0"/>
+          <a:chExt cx="0" cy="0"/>
+        </a:xfrm>
+      </p:grpSpPr>
+      <p:sp>
+        <p:nvSpPr>
+          <p:cNvPr id="2" name="Title 1"/>
+          <p:cNvSpPr>
+            <a:spLocks noGrp="1"/>
+          </p:cNvSpPr>
+          <p:nvPr>
+            <p:ph type="title"/>
+          </p:nvPr>
+        </p:nvSpPr>
+        <p:spPr/>
+        <p:txBody>
+          <a:bodyPr/>
+          <a:lstStyle/>
+          <a:p>
+            <a:pPr algn="ctr"/>
+            <a:r>
+              <a:rPr lang="en-US" dirty="0" smtClean="0"/>
+              <a:t>You are all set to do some commands !</a:t>
+            </a:r>
+            <a:endParaRPr lang="en-US" dirty="0"/>
+          </a:p>
+        </p:txBody>
+      </p:sp>
+    </p:spTree>
+    <p:extLst>
+      <p:ext uri="{BB962C8B-B14F-4D97-AF65-F5344CB8AC3E}">
+        <p14:creationId xmlns:p14="http://schemas.microsoft.com/office/powerpoint/2010/main" val="695806122"/>
       </p:ext>
     </p:extLst>
   </p:cSld>

</xml_diff>